<commit_message>
Changed images related to WiX Toolset and WixSharp.
</commit_message>
<xml_diff>
--- a/GraduateProject/doc/Presentation.pptx
+++ b/GraduateProject/doc/Presentation.pptx
@@ -4305,10 +4305,10 @@
       </p:sp>
       <p:pic>
         <p:nvPicPr>
-          <p:cNvPr id="3074" name="Picture 2" descr="Creating a WiX web setup package using WiX Designer">
+          <p:cNvPr id="3076" name="Picture 4" descr="WiX Toolset v3.6 Failed to Install | Damir&amp;#39;s Corner">
             <a:extLst>
               <a:ext uri="{FF2B5EF4-FFF2-40B4-BE49-F238E27FC236}">
-                <a16:creationId xmlns:a16="http://schemas.microsoft.com/office/drawing/2014/main" id="{87CAC799-0114-4BA3-8485-7705BF929F61}"/>
+                <a16:creationId xmlns:a16="http://schemas.microsoft.com/office/drawing/2014/main" id="{D522F610-9F90-4FD3-A1B8-D688E8A2AB85}"/>
               </a:ext>
             </a:extLst>
           </p:cNvPr>
@@ -4332,8 +4332,8 @@
         </p:blipFill>
         <p:spPr bwMode="auto">
           <a:xfrm>
-            <a:off x="5399655" y="1316274"/>
-            <a:ext cx="6086768" cy="4225452"/>
+            <a:off x="106435" y="1196752"/>
+            <a:ext cx="4975668" cy="4975668"/>
           </a:xfrm>
           <a:prstGeom prst="rect">
             <a:avLst/>
@@ -4352,10 +4352,10 @@
       </p:pic>
       <p:pic>
         <p:nvPicPr>
-          <p:cNvPr id="3076" name="Picture 4" descr="WiX Toolset v3.6 Failed to Install | Damir&amp;#39;s Corner">
+          <p:cNvPr id="1026" name="Picture 2" descr="ProgramFiles64Folder is installing to \Program Files (x86)\ in WIX  Installer - Stack Overflow">
             <a:extLst>
               <a:ext uri="{FF2B5EF4-FFF2-40B4-BE49-F238E27FC236}">
-                <a16:creationId xmlns:a16="http://schemas.microsoft.com/office/drawing/2014/main" id="{D522F610-9F90-4FD3-A1B8-D688E8A2AB85}"/>
+                <a16:creationId xmlns:a16="http://schemas.microsoft.com/office/drawing/2014/main" id="{633CD0EF-1E83-4DFE-A1D6-6488558D3FCF}"/>
               </a:ext>
             </a:extLst>
           </p:cNvPr>
@@ -4364,7 +4364,7 @@
           </p:cNvPicPr>
           <p:nvPr/>
         </p:nvPicPr>
-        <p:blipFill>
+        <p:blipFill rotWithShape="1">
           <a:blip r:embed="rId3">
             <a:extLst>
               <a:ext uri="{28A0092B-C50C-407E-A947-70E740481C1C}">
@@ -4372,15 +4372,13 @@
               </a:ext>
             </a:extLst>
           </a:blip>
-          <a:srcRect/>
-          <a:stretch>
-            <a:fillRect/>
-          </a:stretch>
+          <a:srcRect t="9051" r="23217"/>
+          <a:stretch/>
         </p:blipFill>
         <p:spPr bwMode="auto">
           <a:xfrm>
-            <a:off x="718421" y="1316273"/>
-            <a:ext cx="4225451" cy="4225451"/>
+            <a:off x="5159896" y="1196752"/>
+            <a:ext cx="6918411" cy="4975668"/>
           </a:xfrm>
           <a:prstGeom prst="rect">
             <a:avLst/>
@@ -4441,7 +4439,7 @@
         </p:nvSpPr>
         <p:spPr>
           <a:xfrm>
-            <a:off x="5499202" y="188640"/>
+            <a:off x="4941869" y="155031"/>
             <a:ext cx="2308261" cy="369332"/>
           </a:xfrm>
           <a:prstGeom prst="rect">
@@ -4505,7 +4503,7 @@
         </p:blipFill>
         <p:spPr bwMode="auto">
           <a:xfrm>
-            <a:off x="3216663" y="1268760"/>
+            <a:off x="3210912" y="980728"/>
             <a:ext cx="5770174" cy="1691258"/>
           </a:xfrm>
           <a:prstGeom prst="rect">
@@ -4525,52 +4523,37 @@
       </p:pic>
       <p:pic>
         <p:nvPicPr>
-          <p:cNvPr id="4100" name="Picture 4" descr="Updating WixSharp leads to malfuncion of SetEvVar · Issue #569 · oleg-shilo/ wixsharp · GitHub">
+          <p:cNvPr id="4" name="Picture 3">
             <a:extLst>
               <a:ext uri="{FF2B5EF4-FFF2-40B4-BE49-F238E27FC236}">
-                <a16:creationId xmlns:a16="http://schemas.microsoft.com/office/drawing/2014/main" id="{152ED979-B02E-4E8B-8D5B-FBE32376AFE0}"/>
+                <a16:creationId xmlns:a16="http://schemas.microsoft.com/office/drawing/2014/main" id="{032402F4-8FF8-4D38-B417-B4ED62D93068}"/>
               </a:ext>
             </a:extLst>
           </p:cNvPr>
           <p:cNvPicPr>
-            <a:picLocks noChangeAspect="1" noChangeArrowheads="1"/>
+            <a:picLocks noChangeAspect="1"/>
           </p:cNvPicPr>
           <p:nvPr/>
         </p:nvPicPr>
-        <p:blipFill rotWithShape="1">
-          <a:blip r:embed="rId3">
-            <a:extLst>
-              <a:ext uri="{28A0092B-C50C-407E-A947-70E740481C1C}">
-                <a14:useLocalDpi xmlns:a14="http://schemas.microsoft.com/office/drawing/2010/main" val="0"/>
-              </a:ext>
-            </a:extLst>
-          </a:blip>
-          <a:srcRect t="1816"/>
-          <a:stretch/>
+        <p:blipFill>
+          <a:blip r:embed="rId3"/>
+          <a:stretch>
+            <a:fillRect/>
+          </a:stretch>
         </p:blipFill>
-        <p:spPr bwMode="auto">
+        <p:spPr>
           <a:xfrm>
-            <a:off x="3216663" y="3068960"/>
-            <a:ext cx="5781675" cy="3469610"/>
+            <a:off x="3210913" y="2996952"/>
+            <a:ext cx="5770174" cy="3468368"/>
           </a:xfrm>
           <a:prstGeom prst="rect">
             <a:avLst/>
           </a:prstGeom>
-          <a:noFill/>
           <a:ln>
             <a:solidFill>
               <a:schemeClr val="accent1"/>
             </a:solidFill>
           </a:ln>
-          <a:extLst>
-            <a:ext uri="{909E8E84-426E-40DD-AFC4-6F175D3DCCD1}">
-              <a14:hiddenFill xmlns:a14="http://schemas.microsoft.com/office/drawing/2010/main">
-                <a:solidFill>
-                  <a:srgbClr val="FFFFFF"/>
-                </a:solidFill>
-              </a14:hiddenFill>
-            </a:ext>
-          </a:extLst>
         </p:spPr>
       </p:pic>
     </p:spTree>

</xml_diff>